<commit_message>
Revert "Merge branch 'main' of https://github.com/kurama13717/SPIC"
This reverts commit ca2ddc714d563f321b1627bd8e7f6cffe48337aa, reversing
changes made to 2fd7558e03abaad82d43006082f44eb550be090e.
</commit_message>
<xml_diff>
--- a/日本ゲーム大賞2022応募説明/作品紹介コメント_フォーマット2022/1_作品紹介コメントフォーマット2022.pptx
+++ b/日本ゲーム大賞2022応募説明/作品紹介コメント_フォーマット2022/1_作品紹介コメントフォーマット2022.pptx
@@ -3867,7 +3867,7 @@
           <p:nvPr>
             <p:extLst>
               <p:ext uri="{D42A27DB-BD31-4B8C-83A1-F6EECF244321}">
-                <p14:modId xmlns:p14="http://schemas.microsoft.com/office/powerpoint/2010/main" val="3416530399"/>
+                <p14:modId xmlns:p14="http://schemas.microsoft.com/office/powerpoint/2010/main" val="851400734"/>
               </p:ext>
             </p:extLst>
           </p:nvPr>
@@ -4290,7 +4290,7 @@
                         <a:tabLst/>
                       </a:pPr>
                       <a:r>
-                        <a:rPr kumimoji="1" lang="ja-JP" altLang="en-US" sz="700" b="0" i="0" u="none" strike="noStrike" cap="none" normalizeH="0" baseline="0" dirty="0">
+                        <a:rPr kumimoji="1" lang="ja-JP" altLang="en-US" sz="700" b="0" i="0" u="none" strike="noStrike" cap="none" normalizeH="0" baseline="0">
                           <a:ln>
                             <a:noFill/>
                           </a:ln>
@@ -4301,8 +4301,19 @@
                           <a:latin typeface="Arial" charset="0"/>
                           <a:ea typeface="ＭＳ Ｐゴシック" charset="-128"/>
                         </a:rPr>
-                        <a:t>フリガナ　リフレクトーン</a:t>
+                        <a:t>フリガナ</a:t>
                       </a:r>
+                      <a:endParaRPr kumimoji="1" lang="ja-JP" altLang="en-US" sz="700" b="0" i="0" u="none" strike="noStrike" cap="none" normalizeH="0" baseline="0" dirty="0">
+                        <a:ln>
+                          <a:noFill/>
+                        </a:ln>
+                        <a:solidFill>
+                          <a:schemeClr val="tx1"/>
+                        </a:solidFill>
+                        <a:effectLst/>
+                        <a:latin typeface="Arial" charset="0"/>
+                        <a:ea typeface="ＭＳ Ｐゴシック" charset="-128"/>
+                      </a:endParaRPr>
                     </a:p>
                   </a:txBody>
                   <a:tcPr horzOverflow="overflow">
@@ -4710,7 +4721,7 @@
                           <a:latin typeface="Arial" charset="0"/>
                           <a:ea typeface="ＭＳ Ｐゴシック" charset="-128"/>
                         </a:rPr>
-                        <a:t>☑</a:t>
+                        <a:t>□</a:t>
                       </a:r>
                       <a:r>
                         <a:rPr kumimoji="1" lang="en-US" altLang="ja-JP" sz="1050" b="0" i="0" u="none" strike="noStrike" cap="none" normalizeH="0" baseline="0" dirty="0">
@@ -5181,7 +5192,7 @@
           <p:nvPr>
             <p:extLst>
               <p:ext uri="{D42A27DB-BD31-4B8C-83A1-F6EECF244321}">
-                <p14:modId xmlns:p14="http://schemas.microsoft.com/office/powerpoint/2010/main" val="2138413353"/>
+                <p14:modId xmlns:p14="http://schemas.microsoft.com/office/powerpoint/2010/main" val="1001143541"/>
               </p:ext>
             </p:extLst>
           </p:nvPr>
@@ -6433,41 +6444,6 @@
           </a:graphicData>
         </a:graphic>
       </p:graphicFrame>
-      <p:pic>
-        <p:nvPicPr>
-          <p:cNvPr id="3" name="図 2">
-            <a:extLst>
-              <a:ext uri="{FF2B5EF4-FFF2-40B4-BE49-F238E27FC236}">
-                <a16:creationId xmlns:a16="http://schemas.microsoft.com/office/drawing/2014/main" id="{D51D68C4-4F6F-D7AE-9F14-6168BF0D6CE3}"/>
-              </a:ext>
-            </a:extLst>
-          </p:cNvPr>
-          <p:cNvPicPr>
-            <a:picLocks noChangeAspect="1"/>
-          </p:cNvPicPr>
-          <p:nvPr/>
-        </p:nvPicPr>
-        <p:blipFill rotWithShape="1">
-          <a:blip r:embed="rId2">
-            <a:extLst>
-              <a:ext uri="{28A0092B-C50C-407E-A947-70E740481C1C}">
-                <a14:useLocalDpi xmlns:a14="http://schemas.microsoft.com/office/drawing/2010/main" val="0"/>
-              </a:ext>
-            </a:extLst>
-          </a:blip>
-          <a:srcRect t="345" b="4342"/>
-          <a:stretch/>
-        </p:blipFill>
-        <p:spPr>
-          <a:xfrm>
-            <a:off x="136525" y="2263152"/>
-            <a:ext cx="6678612" cy="7161194"/>
-          </a:xfrm>
-          <a:prstGeom prst="rect">
-            <a:avLst/>
-          </a:prstGeom>
-        </p:spPr>
-      </p:pic>
     </p:spTree>
   </p:cSld>
   <p:clrMapOvr>

</xml_diff>